<commit_message>
added austin information to  my slide
</commit_message>
<xml_diff>
--- a/Presentation/Real Estate Data Analysis - Average Sale Price and Other Factors.pptx
+++ b/Presentation/Real Estate Data Analysis - Average Sale Price and Other Factors.pptx
@@ -13,11 +13,13 @@
     <p:sldId id="261" r:id="rId7"/>
     <p:sldId id="266" r:id="rId8"/>
     <p:sldId id="267" r:id="rId9"/>
-    <p:sldId id="268" r:id="rId10"/>
-    <p:sldId id="262" r:id="rId11"/>
-    <p:sldId id="264" r:id="rId12"/>
-    <p:sldId id="265" r:id="rId13"/>
-    <p:sldId id="263" r:id="rId14"/>
+    <p:sldId id="269" r:id="rId10"/>
+    <p:sldId id="268" r:id="rId11"/>
+    <p:sldId id="262" r:id="rId12"/>
+    <p:sldId id="264" r:id="rId13"/>
+    <p:sldId id="265" r:id="rId14"/>
+    <p:sldId id="271" r:id="rId15"/>
+    <p:sldId id="270" r:id="rId16"/>
   </p:sldIdLst>
   <p:sldSz cx="12192000" cy="6858000"/>
   <p:notesSz cx="6858000" cy="9144000"/>
@@ -4672,6 +4674,150 @@
           <p:cNvPr id="2" name="Title 1">
             <a:extLst>
               <a:ext uri="{FF2B5EF4-FFF2-40B4-BE49-F238E27FC236}">
+                <a16:creationId xmlns:a16="http://schemas.microsoft.com/office/drawing/2014/main" id="{0B568B32-3A11-4D70-84C8-832481F03DA7}"/>
+              </a:ext>
+            </a:extLst>
+          </p:cNvPr>
+          <p:cNvSpPr>
+            <a:spLocks noGrp="1"/>
+          </p:cNvSpPr>
+          <p:nvPr>
+            <p:ph type="title"/>
+          </p:nvPr>
+        </p:nvSpPr>
+        <p:spPr>
+          <a:xfrm>
+            <a:off x="414867" y="519827"/>
+            <a:ext cx="9228667" cy="1135406"/>
+          </a:xfrm>
+        </p:spPr>
+        <p:txBody>
+          <a:bodyPr/>
+          <a:lstStyle/>
+          <a:p>
+            <a:r>
+              <a:rPr lang="en-US" b="1" dirty="0"/>
+              <a:t>Are the houses selling (contd.)</a:t>
+            </a:r>
+          </a:p>
+        </p:txBody>
+      </p:sp>
+      <p:sp>
+        <p:nvSpPr>
+          <p:cNvPr id="3" name="Content Placeholder 2">
+            <a:extLst>
+              <a:ext uri="{FF2B5EF4-FFF2-40B4-BE49-F238E27FC236}">
+                <a16:creationId xmlns:a16="http://schemas.microsoft.com/office/drawing/2014/main" id="{1B04470E-59CF-46A6-A66D-F98B1BC2EFC8}"/>
+              </a:ext>
+            </a:extLst>
+          </p:cNvPr>
+          <p:cNvSpPr>
+            <a:spLocks noGrp="1"/>
+          </p:cNvSpPr>
+          <p:nvPr>
+            <p:ph idx="1"/>
+          </p:nvPr>
+        </p:nvSpPr>
+        <p:spPr>
+          <a:xfrm>
+            <a:off x="448736" y="1506220"/>
+            <a:ext cx="8978900" cy="966047"/>
+          </a:xfrm>
+        </p:spPr>
+        <p:txBody>
+          <a:bodyPr/>
+          <a:lstStyle/>
+          <a:p>
+            <a:pPr marL="0" indent="0">
+              <a:buNone/>
+            </a:pPr>
+            <a:r>
+              <a:rPr lang="en-US" b="1" dirty="0"/>
+              <a:t>Chicago</a:t>
+            </a:r>
+          </a:p>
+          <a:p>
+            <a:pPr marL="0" indent="0">
+              <a:buNone/>
+            </a:pPr>
+            <a:r>
+              <a:rPr lang="en-US" dirty="0"/>
+              <a:t>No. Overall a bad housing market, so no further analysis conducted.</a:t>
+            </a:r>
+          </a:p>
+        </p:txBody>
+      </p:sp>
+      <p:pic>
+        <p:nvPicPr>
+          <p:cNvPr id="5" name="Picture 4">
+            <a:extLst>
+              <a:ext uri="{FF2B5EF4-FFF2-40B4-BE49-F238E27FC236}">
+                <a16:creationId xmlns:a16="http://schemas.microsoft.com/office/drawing/2014/main" id="{003AAD1E-29C1-4D5E-9E4C-8B00132BDA53}"/>
+              </a:ext>
+            </a:extLst>
+          </p:cNvPr>
+          <p:cNvPicPr>
+            <a:picLocks noChangeAspect="1"/>
+          </p:cNvPicPr>
+          <p:nvPr/>
+        </p:nvPicPr>
+        <p:blipFill>
+          <a:blip r:embed="rId2">
+            <a:extLst>
+              <a:ext uri="{28A0092B-C50C-407E-A947-70E740481C1C}">
+                <a14:useLocalDpi xmlns:a14="http://schemas.microsoft.com/office/drawing/2010/main" val="0"/>
+              </a:ext>
+            </a:extLst>
+          </a:blip>
+          <a:stretch>
+            <a:fillRect/>
+          </a:stretch>
+        </p:blipFill>
+        <p:spPr>
+          <a:xfrm>
+            <a:off x="448736" y="2986617"/>
+            <a:ext cx="8665631" cy="3410627"/>
+          </a:xfrm>
+          <a:prstGeom prst="rect">
+            <a:avLst/>
+          </a:prstGeom>
+        </p:spPr>
+      </p:pic>
+    </p:spTree>
+    <p:extLst>
+      <p:ext uri="{BB962C8B-B14F-4D97-AF65-F5344CB8AC3E}">
+        <p14:creationId xmlns:p14="http://schemas.microsoft.com/office/powerpoint/2010/main" val="80936674"/>
+      </p:ext>
+    </p:extLst>
+  </p:cSld>
+  <p:clrMapOvr>
+    <a:masterClrMapping/>
+  </p:clrMapOvr>
+</p:sld>
+</file>
+
+<file path=ppt/slides/slide11.xml><?xml version="1.0" encoding="utf-8"?>
+<p:sld xmlns:a="http://schemas.openxmlformats.org/drawingml/2006/main" xmlns:r="http://schemas.openxmlformats.org/officeDocument/2006/relationships" xmlns:p="http://schemas.openxmlformats.org/presentationml/2006/main">
+  <p:cSld>
+    <p:spTree>
+      <p:nvGrpSpPr>
+        <p:cNvPr id="1" name=""/>
+        <p:cNvGrpSpPr/>
+        <p:nvPr/>
+      </p:nvGrpSpPr>
+      <p:grpSpPr>
+        <a:xfrm>
+          <a:off x="0" y="0"/>
+          <a:ext cx="0" cy="0"/>
+          <a:chOff x="0" y="0"/>
+          <a:chExt cx="0" cy="0"/>
+        </a:xfrm>
+      </p:grpSpPr>
+      <p:sp>
+        <p:nvSpPr>
+          <p:cNvPr id="2" name="Title 1">
+            <a:extLst>
+              <a:ext uri="{FF2B5EF4-FFF2-40B4-BE49-F238E27FC236}">
                 <a16:creationId xmlns:a16="http://schemas.microsoft.com/office/drawing/2014/main" id="{C797BF64-0D74-427A-BB32-B166B88009FA}"/>
               </a:ext>
             </a:extLst>
@@ -4685,86 +4831,20 @@
         </p:nvSpPr>
         <p:spPr>
           <a:xfrm>
-            <a:off x="1066801" y="642593"/>
+            <a:off x="452967" y="489285"/>
             <a:ext cx="9804400" cy="898340"/>
           </a:xfrm>
         </p:spPr>
         <p:txBody>
           <a:bodyPr>
-            <a:normAutofit fontScale="90000"/>
+            <a:normAutofit/>
           </a:bodyPr>
           <a:lstStyle/>
           <a:p>
             <a:r>
               <a:rPr lang="en-US" dirty="0"/>
-              <a:t>So… When it comes to house sales what sells more? Going by the three factors - Room Count, Bedroom count and  bathroom count here are our findings:</a:t>
-            </a:r>
-            <a:br>
-              <a:rPr lang="en-US" dirty="0"/>
-            </a:br>
-            <a:br>
-              <a:rPr lang="en-US" dirty="0"/>
-            </a:br>
-            <a:r>
-              <a:rPr lang="en-US" dirty="0"/>
-              <a:t>Cupertino : 8 rooms, 3 bedrooms, 2 baths</a:t>
-            </a:r>
-            <a:br>
-              <a:rPr lang="en-US" dirty="0"/>
-            </a:br>
-            <a:br>
-              <a:rPr lang="en-US" dirty="0"/>
-            </a:br>
-            <a:br>
-              <a:rPr lang="en-US" dirty="0"/>
-            </a:br>
-            <a:br>
-              <a:rPr lang="en-US" dirty="0"/>
-            </a:br>
-            <a:r>
-              <a:rPr lang="en-US" dirty="0"/>
               <a:t>What sold the most?</a:t>
             </a:r>
-            <a:br>
-              <a:rPr lang="en-US" dirty="0"/>
-            </a:br>
-            <a:br>
-              <a:rPr lang="en-US" dirty="0"/>
-            </a:br>
-            <a:br>
-              <a:rPr lang="en-US" dirty="0"/>
-            </a:br>
-            <a:br>
-              <a:rPr lang="en-US" dirty="0"/>
-            </a:br>
-            <a:br>
-              <a:rPr lang="en-US" dirty="0"/>
-            </a:br>
-            <a:r>
-              <a:rPr lang="en-US" dirty="0"/>
-              <a:t>Syracuse:6 rooms, 2 bedrooms, 2 baths.</a:t>
-            </a:r>
-            <a:br>
-              <a:rPr lang="en-US" dirty="0"/>
-            </a:br>
-            <a:r>
-              <a:rPr lang="en-US" dirty="0"/>
-              <a:t>Note: In Syracuse they have three-quarter bath!! </a:t>
-            </a:r>
-            <a:br>
-              <a:rPr lang="en-US" dirty="0"/>
-            </a:br>
-            <a:r>
-              <a:rPr lang="en-US" dirty="0"/>
-              <a:t>A three-quarter bathroom, sometimes simply called a three-quarter or 3/4 bath, is generally one with a toilet, sink and shower, but not a tub.</a:t>
-            </a:r>
-            <a:br>
-              <a:rPr lang="en-US" dirty="0"/>
-            </a:br>
-            <a:br>
-              <a:rPr lang="en-US" dirty="0"/>
-            </a:br>
-            <a:endParaRPr lang="en-US" dirty="0"/>
           </a:p>
         </p:txBody>
       </p:sp>
@@ -4786,7 +4866,7 @@
         </p:nvSpPr>
         <p:spPr>
           <a:xfrm>
-            <a:off x="990600" y="1684867"/>
+            <a:off x="516790" y="1525345"/>
             <a:ext cx="10210800" cy="4326466"/>
           </a:xfrm>
         </p:spPr>
@@ -4798,12 +4878,47 @@
               <a:buNone/>
             </a:pPr>
             <a:r>
+              <a:rPr lang="en-US" sz="4000" dirty="0"/>
+              <a:t>So, based on room count, bedroom count and bath count here’s our findings:</a:t>
+            </a:r>
+          </a:p>
+          <a:p>
+            <a:pPr marL="0" indent="0">
+              <a:buNone/>
+            </a:pPr>
+            <a:r>
               <a:rPr lang="en-US" sz="4000" b="1" dirty="0"/>
               <a:t>Cupertino</a:t>
             </a:r>
             <a:r>
               <a:rPr lang="en-US" sz="4000" dirty="0"/>
               <a:t>:  8 rooms, 3 bedrooms,2 baths.</a:t>
+            </a:r>
+          </a:p>
+          <a:p>
+            <a:pPr marL="0" indent="0">
+              <a:buNone/>
+            </a:pPr>
+            <a:r>
+              <a:rPr lang="en-US" sz="4000" b="1" dirty="0"/>
+              <a:t>Syracuse</a:t>
+            </a:r>
+            <a:r>
+              <a:rPr lang="en-US" sz="4000" dirty="0"/>
+              <a:t>: 6 rooms, 2 bedrooms, 2 baths.</a:t>
+            </a:r>
+          </a:p>
+          <a:p>
+            <a:pPr marL="0" indent="0">
+              <a:buNone/>
+            </a:pPr>
+            <a:r>
+              <a:rPr lang="en-US" sz="4000" b="1" dirty="0"/>
+              <a:t>Austin</a:t>
+            </a:r>
+            <a:r>
+              <a:rPr lang="en-US" sz="4000" dirty="0"/>
+              <a:t>: No data room on room count or bedroom count, 2 baths. </a:t>
             </a:r>
           </a:p>
           <a:p>
@@ -4836,7 +4951,7 @@
 </p:sld>
 </file>
 
-<file path=ppt/slides/slide11.xml><?xml version="1.0" encoding="utf-8"?>
+<file path=ppt/slides/slide12.xml><?xml version="1.0" encoding="utf-8"?>
 <p:sld xmlns:a="http://schemas.openxmlformats.org/drawingml/2006/main" xmlns:r="http://schemas.openxmlformats.org/officeDocument/2006/relationships" xmlns:p="http://schemas.openxmlformats.org/presentationml/2006/main">
   <p:cSld>
     <p:spTree>
@@ -4982,7 +5097,7 @@
         </p:blipFill>
         <p:spPr>
           <a:xfrm>
-            <a:off x="5856712" y="3429000"/>
+            <a:off x="5666212" y="3425164"/>
             <a:ext cx="5979689" cy="2989845"/>
           </a:xfrm>
           <a:prstGeom prst="rect">
@@ -5003,7 +5118,7 @@
 </p:sld>
 </file>
 
-<file path=ppt/slides/slide12.xml><?xml version="1.0" encoding="utf-8"?>
+<file path=ppt/slides/slide13.xml><?xml version="1.0" encoding="utf-8"?>
 <p:sld xmlns:a="http://schemas.openxmlformats.org/drawingml/2006/main" xmlns:r="http://schemas.openxmlformats.org/officeDocument/2006/relationships" xmlns:p="http://schemas.openxmlformats.org/presentationml/2006/main">
   <p:cSld>
     <p:spTree>
@@ -5168,7 +5283,7 @@
 </p:sld>
 </file>
 
-<file path=ppt/slides/slide13.xml><?xml version="1.0" encoding="utf-8"?>
+<file path=ppt/slides/slide14.xml><?xml version="1.0" encoding="utf-8"?>
 <p:sld xmlns:a="http://schemas.openxmlformats.org/drawingml/2006/main" xmlns:r="http://schemas.openxmlformats.org/officeDocument/2006/relationships" xmlns:p="http://schemas.openxmlformats.org/presentationml/2006/main">
   <p:cSld>
     <p:spTree>
@@ -5190,7 +5305,7 @@
           <p:cNvPr id="2" name="Title 1">
             <a:extLst>
               <a:ext uri="{FF2B5EF4-FFF2-40B4-BE49-F238E27FC236}">
-                <a16:creationId xmlns:a16="http://schemas.microsoft.com/office/drawing/2014/main" id="{ED8311B8-15B0-4A16-B14D-880A789933F1}"/>
+                <a16:creationId xmlns:a16="http://schemas.microsoft.com/office/drawing/2014/main" id="{9A301D10-A4FC-4507-BA85-9EF798404D95}"/>
               </a:ext>
             </a:extLst>
           </p:cNvPr>
@@ -5203,104 +5318,278 @@
         </p:nvSpPr>
         <p:spPr>
           <a:xfrm>
-            <a:off x="1066800" y="642594"/>
-            <a:ext cx="10058400" cy="1859306"/>
-          </a:xfrm>
-        </p:spPr>
-        <p:txBody>
-          <a:bodyPr>
-            <a:normAutofit fontScale="90000"/>
-          </a:bodyPr>
+            <a:off x="419100" y="452094"/>
+            <a:ext cx="2175933" cy="995706"/>
+          </a:xfrm>
+        </p:spPr>
+        <p:txBody>
+          <a:bodyPr/>
           <a:lstStyle/>
           <a:p>
-            <a:pPr marL="274320" marR="0" lvl="1" algn="l" defTabSz="914400" rtl="0" eaLnBrk="1" fontAlgn="auto" latinLnBrk="0" hangingPunct="1">
-              <a:lnSpc>
-                <a:spcPct val="100000"/>
-              </a:lnSpc>
-              <a:spcBef>
-                <a:spcPts val="500"/>
-              </a:spcBef>
-              <a:spcAft>
-                <a:spcPts val="0"/>
-              </a:spcAft>
-              <a:buClr>
-                <a:srgbClr val="000000">
-                  <a:lumMod val="85000"/>
-                  <a:lumOff val="15000"/>
-                </a:srgbClr>
-              </a:buClr>
-              <a:buSzTx/>
-              <a:tabLst/>
-              <a:defRPr/>
-            </a:pPr>
-            <a:r>
-              <a:rPr lang="en-US" sz="2400" kern="1200" dirty="0">
+            <a:r>
+              <a:rPr lang="en-US" dirty="0"/>
+              <a:t>Austin</a:t>
+            </a:r>
+          </a:p>
+        </p:txBody>
+      </p:sp>
+      <p:pic>
+        <p:nvPicPr>
+          <p:cNvPr id="13" name="Content Placeholder 12">
+            <a:extLst>
+              <a:ext uri="{FF2B5EF4-FFF2-40B4-BE49-F238E27FC236}">
+                <a16:creationId xmlns:a16="http://schemas.microsoft.com/office/drawing/2014/main" id="{AA61D303-FB42-49E7-9530-8591F8F29A2B}"/>
+              </a:ext>
+            </a:extLst>
+          </p:cNvPr>
+          <p:cNvPicPr>
+            <a:picLocks noGrp="1" noChangeAspect="1"/>
+          </p:cNvPicPr>
+          <p:nvPr>
+            <p:ph idx="1"/>
+          </p:nvPr>
+        </p:nvPicPr>
+        <p:blipFill>
+          <a:blip r:embed="rId2">
+            <a:extLst>
+              <a:ext uri="{28A0092B-C50C-407E-A947-70E740481C1C}">
+                <a14:useLocalDpi xmlns:a14="http://schemas.microsoft.com/office/drawing/2010/main" val="0"/>
+              </a:ext>
+            </a:extLst>
+          </a:blip>
+          <a:stretch>
+            <a:fillRect/>
+          </a:stretch>
+        </p:blipFill>
+        <p:spPr>
+          <a:xfrm>
+            <a:off x="5726643" y="405871"/>
+            <a:ext cx="6046257" cy="3023129"/>
+          </a:xfrm>
+        </p:spPr>
+      </p:pic>
+      <p:pic>
+        <p:nvPicPr>
+          <p:cNvPr id="15" name="Picture 14">
+            <a:extLst>
+              <a:ext uri="{FF2B5EF4-FFF2-40B4-BE49-F238E27FC236}">
+                <a16:creationId xmlns:a16="http://schemas.microsoft.com/office/drawing/2014/main" id="{8A8396AC-E9E9-44BD-9AE1-BCF03906E1AA}"/>
+              </a:ext>
+            </a:extLst>
+          </p:cNvPr>
+          <p:cNvPicPr>
+            <a:picLocks noChangeAspect="1"/>
+          </p:cNvPicPr>
+          <p:nvPr/>
+        </p:nvPicPr>
+        <p:blipFill>
+          <a:blip r:embed="rId3">
+            <a:extLst>
+              <a:ext uri="{28A0092B-C50C-407E-A947-70E740481C1C}">
+                <a14:useLocalDpi xmlns:a14="http://schemas.microsoft.com/office/drawing/2010/main" val="0"/>
+              </a:ext>
+            </a:extLst>
+          </a:blip>
+          <a:stretch>
+            <a:fillRect/>
+          </a:stretch>
+        </p:blipFill>
+        <p:spPr>
+          <a:xfrm>
+            <a:off x="401110" y="1338263"/>
+            <a:ext cx="5325533" cy="3606800"/>
+          </a:xfrm>
+          <a:prstGeom prst="rect">
+            <a:avLst/>
+          </a:prstGeom>
+        </p:spPr>
+      </p:pic>
+      <p:pic>
+        <p:nvPicPr>
+          <p:cNvPr id="17" name="Picture 16">
+            <a:extLst>
+              <a:ext uri="{FF2B5EF4-FFF2-40B4-BE49-F238E27FC236}">
+                <a16:creationId xmlns:a16="http://schemas.microsoft.com/office/drawing/2014/main" id="{61889C05-512E-440E-9C7F-C56A7F5F68FB}"/>
+              </a:ext>
+            </a:extLst>
+          </p:cNvPr>
+          <p:cNvPicPr>
+            <a:picLocks noChangeAspect="1"/>
+          </p:cNvPicPr>
+          <p:nvPr/>
+        </p:nvPicPr>
+        <p:blipFill>
+          <a:blip r:embed="rId4">
+            <a:extLst>
+              <a:ext uri="{28A0092B-C50C-407E-A947-70E740481C1C}">
+                <a14:useLocalDpi xmlns:a14="http://schemas.microsoft.com/office/drawing/2010/main" val="0"/>
+              </a:ext>
+            </a:extLst>
+          </a:blip>
+          <a:stretch>
+            <a:fillRect/>
+          </a:stretch>
+        </p:blipFill>
+        <p:spPr>
+          <a:xfrm>
+            <a:off x="5943601" y="3526896"/>
+            <a:ext cx="5672666" cy="2836333"/>
+          </a:xfrm>
+          <a:prstGeom prst="rect">
+            <a:avLst/>
+          </a:prstGeom>
+        </p:spPr>
+      </p:pic>
+    </p:spTree>
+    <p:extLst>
+      <p:ext uri="{BB962C8B-B14F-4D97-AF65-F5344CB8AC3E}">
+        <p14:creationId xmlns:p14="http://schemas.microsoft.com/office/powerpoint/2010/main" val="2958566576"/>
+      </p:ext>
+    </p:extLst>
+  </p:cSld>
+  <p:clrMapOvr>
+    <a:masterClrMapping/>
+  </p:clrMapOvr>
+</p:sld>
+</file>
+
+<file path=ppt/slides/slide15.xml><?xml version="1.0" encoding="utf-8"?>
+<p:sld xmlns:a="http://schemas.openxmlformats.org/drawingml/2006/main" xmlns:r="http://schemas.openxmlformats.org/officeDocument/2006/relationships" xmlns:p="http://schemas.openxmlformats.org/presentationml/2006/main">
+  <p:cSld>
+    <p:spTree>
+      <p:nvGrpSpPr>
+        <p:cNvPr id="1" name=""/>
+        <p:cNvGrpSpPr/>
+        <p:nvPr/>
+      </p:nvGrpSpPr>
+      <p:grpSpPr>
+        <a:xfrm>
+          <a:off x="0" y="0"/>
+          <a:ext cx="0" cy="0"/>
+          <a:chOff x="0" y="0"/>
+          <a:chExt cx="0" cy="0"/>
+        </a:xfrm>
+      </p:grpSpPr>
+      <p:sp>
+        <p:nvSpPr>
+          <p:cNvPr id="2" name="Title 1">
+            <a:extLst>
+              <a:ext uri="{FF2B5EF4-FFF2-40B4-BE49-F238E27FC236}">
+                <a16:creationId xmlns:a16="http://schemas.microsoft.com/office/drawing/2014/main" id="{FA2E51C4-7052-4634-968A-0B6EA7F0C8A5}"/>
+              </a:ext>
+            </a:extLst>
+          </p:cNvPr>
+          <p:cNvSpPr>
+            <a:spLocks noGrp="1"/>
+          </p:cNvSpPr>
+          <p:nvPr>
+            <p:ph type="title"/>
+          </p:nvPr>
+        </p:nvSpPr>
+        <p:spPr/>
+        <p:txBody>
+          <a:bodyPr/>
+          <a:lstStyle/>
+          <a:p>
+            <a:r>
+              <a:rPr lang="en-US" dirty="0">
                 <a:solidFill>
                   <a:srgbClr val="000000">
                     <a:lumMod val="75000"/>
                     <a:lumOff val="25000"/>
                   </a:srgbClr>
                 </a:solidFill>
-                <a:latin typeface="Garamond" panose="02020404030301010803"/>
-                <a:ea typeface="+mn-ea"/>
-                <a:cs typeface="+mn-cs"/>
               </a:rPr>
-              <a:t>Summary:</a:t>
-            </a:r>
+              <a:t>The Story:</a:t>
+            </a:r>
+            <a:endParaRPr lang="en-US" dirty="0"/>
+          </a:p>
+        </p:txBody>
+      </p:sp>
+      <p:sp>
+        <p:nvSpPr>
+          <p:cNvPr id="3" name="Content Placeholder 2">
+            <a:extLst>
+              <a:ext uri="{FF2B5EF4-FFF2-40B4-BE49-F238E27FC236}">
+                <a16:creationId xmlns:a16="http://schemas.microsoft.com/office/drawing/2014/main" id="{2BAC2893-EECA-4373-8260-CA50098E6D0C}"/>
+              </a:ext>
+            </a:extLst>
+          </p:cNvPr>
+          <p:cNvSpPr>
+            <a:spLocks noGrp="1"/>
+          </p:cNvSpPr>
+          <p:nvPr>
+            <p:ph idx="1"/>
+          </p:nvPr>
+        </p:nvSpPr>
+        <p:spPr/>
+        <p:txBody>
+          <a:bodyPr/>
+          <a:lstStyle/>
+          <a:p>
+            <a:pPr marL="0" indent="0">
+              <a:buNone/>
+            </a:pPr>
             <a:br>
-              <a:rPr lang="en-US" sz="2400" kern="1200" dirty="0">
+              <a:rPr lang="en-US" sz="2400" dirty="0">
                 <a:solidFill>
                   <a:srgbClr val="000000">
                     <a:lumMod val="75000"/>
                     <a:lumOff val="25000"/>
                   </a:srgbClr>
                 </a:solidFill>
-                <a:latin typeface="Garamond" panose="02020404030301010803"/>
-                <a:ea typeface="+mn-ea"/>
-                <a:cs typeface="+mn-cs"/>
               </a:rPr>
             </a:br>
             <a:r>
-              <a:rPr lang="en-US" sz="2400" kern="1200" dirty="0">
+              <a:rPr lang="en-US" sz="2400" dirty="0">
                 <a:solidFill>
                   <a:srgbClr val="000000">
                     <a:lumMod val="75000"/>
                     <a:lumOff val="25000"/>
                   </a:srgbClr>
                 </a:solidFill>
-                <a:latin typeface="Garamond" panose="02020404030301010803"/>
-                <a:ea typeface="+mn-ea"/>
-                <a:cs typeface="+mn-cs"/>
               </a:rPr>
-              <a:t>Syracuse is the top market.</a:t>
+              <a:t>Austin and Syracuse are top markets.</a:t>
             </a:r>
             <a:br>
-              <a:rPr lang="en-US" sz="2400" kern="1200" dirty="0">
+              <a:rPr lang="en-US" sz="2400" dirty="0">
                 <a:solidFill>
                   <a:srgbClr val="000000">
                     <a:lumMod val="75000"/>
                     <a:lumOff val="25000"/>
                   </a:srgbClr>
                 </a:solidFill>
-                <a:latin typeface="Garamond" panose="02020404030301010803"/>
-                <a:ea typeface="+mn-ea"/>
-                <a:cs typeface="+mn-cs"/>
               </a:rPr>
             </a:br>
             <a:r>
-              <a:rPr lang="en-US" sz="2400" kern="1200" dirty="0">
+              <a:rPr lang="en-US" sz="2400" dirty="0">
                 <a:solidFill>
                   <a:srgbClr val="000000">
                     <a:lumMod val="75000"/>
                     <a:lumOff val="25000"/>
                   </a:srgbClr>
                 </a:solidFill>
-                <a:latin typeface="Garamond" panose="02020404030301010803"/>
-                <a:ea typeface="+mn-ea"/>
-                <a:cs typeface="+mn-cs"/>
               </a:rPr>
-              <a:t>Mid size homes with 6-8 rooms, 2 baths and 3 bedrooms are the top performers</a:t>
-            </a:r>
+              <a:t>People generally prefer mid size homes with 2 baths.</a:t>
+            </a:r>
+          </a:p>
+          <a:p>
+            <a:pPr marL="0" indent="0">
+              <a:buNone/>
+            </a:pPr>
+            <a:endParaRPr lang="en-US" sz="2400" dirty="0">
+              <a:solidFill>
+                <a:srgbClr val="000000">
+                  <a:lumMod val="75000"/>
+                  <a:lumOff val="25000"/>
+                </a:srgbClr>
+              </a:solidFill>
+            </a:endParaRPr>
+          </a:p>
+          <a:p>
+            <a:pPr marL="0" indent="0">
+              <a:buNone/>
+            </a:pPr>
             <a:br>
               <a:rPr lang="en-US" dirty="0">
                 <a:solidFill>
@@ -5312,7 +5601,7 @@
               </a:rPr>
             </a:br>
             <a:r>
-              <a:rPr lang="en-US" dirty="0">
+              <a:rPr lang="en-US" sz="2400" dirty="0">
                 <a:solidFill>
                   <a:schemeClr val="tx1">
                     <a:lumMod val="75000"/>
@@ -5320,10 +5609,15 @@
                   </a:schemeClr>
                 </a:solidFill>
               </a:rPr>
-              <a:t>Other factors like Parking and Lot size do not have a major impact on the sale.</a:t>
-            </a:r>
-            <a:br>
-              <a:rPr lang="en-US" dirty="0">
+              <a:t>Is America ready for live work and play community? </a:t>
+            </a:r>
+          </a:p>
+          <a:p>
+            <a:pPr marL="0" indent="0">
+              <a:buNone/>
+            </a:pPr>
+            <a:r>
+              <a:rPr lang="en-US" sz="2400" dirty="0">
                 <a:solidFill>
                   <a:schemeClr val="tx1">
                     <a:lumMod val="75000"/>
@@ -5331,47 +5625,16 @@
                   </a:schemeClr>
                 </a:solidFill>
               </a:rPr>
-            </a:br>
-            <a:br>
-              <a:rPr lang="en-US" dirty="0">
-                <a:solidFill>
-                  <a:schemeClr val="tx1">
-                    <a:lumMod val="75000"/>
-                    <a:lumOff val="25000"/>
-                  </a:schemeClr>
-                </a:solidFill>
-              </a:rPr>
-            </a:br>
-            <a:r>
-              <a:rPr lang="en-US" dirty="0" err="1">
-                <a:solidFill>
-                  <a:schemeClr val="tx1">
-                    <a:lumMod val="75000"/>
-                    <a:lumOff val="25000"/>
-                  </a:schemeClr>
-                </a:solidFill>
-              </a:rPr>
-              <a:t>So..America</a:t>
-            </a:r>
-            <a:r>
-              <a:rPr lang="en-US" dirty="0">
-                <a:solidFill>
-                  <a:schemeClr val="tx1">
-                    <a:lumMod val="75000"/>
-                    <a:lumOff val="25000"/>
-                  </a:schemeClr>
-                </a:solidFill>
-              </a:rPr>
-              <a:t> is fairly ready for live work and play community.</a:t>
-            </a:r>
-            <a:endParaRPr lang="en-US" dirty="0"/>
+              <a:t>…Further analysis is required.</a:t>
+            </a:r>
+            <a:endParaRPr lang="en-US" sz="2400" dirty="0"/>
           </a:p>
         </p:txBody>
       </p:sp>
     </p:spTree>
     <p:extLst>
       <p:ext uri="{BB962C8B-B14F-4D97-AF65-F5344CB8AC3E}">
-        <p14:creationId xmlns:p14="http://schemas.microsoft.com/office/powerpoint/2010/main" val="3483882046"/>
+        <p14:creationId xmlns:p14="http://schemas.microsoft.com/office/powerpoint/2010/main" val="529945658"/>
       </p:ext>
     </p:extLst>
   </p:cSld>
@@ -5702,7 +5965,7 @@
           <a:lstStyle/>
           <a:p>
             <a:r>
-              <a:rPr lang="en-US" sz="2800"/>
+              <a:rPr lang="en-US" sz="2800" dirty="0"/>
               <a:t>Core Message/Hypothesis:</a:t>
             </a:r>
           </a:p>
@@ -6373,13 +6636,18 @@
             <p:ph type="title"/>
           </p:nvPr>
         </p:nvSpPr>
-        <p:spPr/>
+        <p:spPr>
+          <a:xfrm>
+            <a:off x="457200" y="342028"/>
+            <a:ext cx="10058400" cy="788272"/>
+          </a:xfrm>
+        </p:spPr>
         <p:txBody>
           <a:bodyPr/>
           <a:lstStyle/>
           <a:p>
             <a:r>
-              <a:rPr lang="en-US" dirty="0"/>
+              <a:rPr lang="en-US" b="1" dirty="0"/>
               <a:t>Are the houses selling?</a:t>
             </a:r>
           </a:p>
@@ -6401,7 +6669,12 @@
             <p:ph idx="1"/>
           </p:nvPr>
         </p:nvSpPr>
-        <p:spPr/>
+        <p:spPr>
+          <a:xfrm>
+            <a:off x="567267" y="1256454"/>
+            <a:ext cx="10058400" cy="919480"/>
+          </a:xfrm>
+        </p:spPr>
         <p:txBody>
           <a:bodyPr/>
           <a:lstStyle/>
@@ -6456,7 +6729,7 @@
         </p:blipFill>
         <p:spPr>
           <a:xfrm>
-            <a:off x="1209132" y="3056467"/>
+            <a:off x="1209132" y="2971807"/>
             <a:ext cx="9615501" cy="3226930"/>
           </a:xfrm>
           <a:prstGeom prst="rect">
@@ -6512,8 +6785,8 @@
         </p:nvSpPr>
         <p:spPr>
           <a:xfrm>
-            <a:off x="1066800" y="575733"/>
-            <a:ext cx="10058400" cy="5377011"/>
+            <a:off x="495301" y="1130300"/>
+            <a:ext cx="10058400" cy="1003300"/>
           </a:xfrm>
         </p:spPr>
         <p:txBody>
@@ -6571,7 +6844,7 @@
         </p:blipFill>
         <p:spPr>
           <a:xfrm>
-            <a:off x="1130301" y="1609005"/>
+            <a:off x="520701" y="2303271"/>
             <a:ext cx="9931397" cy="3310466"/>
           </a:xfrm>
           <a:prstGeom prst="rect">
@@ -6579,6 +6852,39 @@
           </a:prstGeom>
         </p:spPr>
       </p:pic>
+      <p:sp>
+        <p:nvSpPr>
+          <p:cNvPr id="4" name="Title 1">
+            <a:extLst>
+              <a:ext uri="{FF2B5EF4-FFF2-40B4-BE49-F238E27FC236}">
+                <a16:creationId xmlns:a16="http://schemas.microsoft.com/office/drawing/2014/main" id="{B363EC31-8CD6-419E-818A-B754B95175C9}"/>
+              </a:ext>
+            </a:extLst>
+          </p:cNvPr>
+          <p:cNvSpPr>
+            <a:spLocks noGrp="1"/>
+          </p:cNvSpPr>
+          <p:nvPr>
+            <p:ph type="title"/>
+          </p:nvPr>
+        </p:nvSpPr>
+        <p:spPr>
+          <a:xfrm>
+            <a:off x="457200" y="342028"/>
+            <a:ext cx="10058400" cy="788272"/>
+          </a:xfrm>
+        </p:spPr>
+        <p:txBody>
+          <a:bodyPr/>
+          <a:lstStyle/>
+          <a:p>
+            <a:r>
+              <a:rPr lang="en-US" b="1" dirty="0"/>
+              <a:t>Are the houses selling? (cont.)</a:t>
+            </a:r>
+          </a:p>
+        </p:txBody>
+      </p:sp>
     </p:spTree>
     <p:extLst>
       <p:ext uri="{BB962C8B-B14F-4D97-AF65-F5344CB8AC3E}">
@@ -6614,7 +6920,7 @@
           <p:cNvPr id="2" name="Title 1">
             <a:extLst>
               <a:ext uri="{FF2B5EF4-FFF2-40B4-BE49-F238E27FC236}">
-                <a16:creationId xmlns:a16="http://schemas.microsoft.com/office/drawing/2014/main" id="{0B568B32-3A11-4D70-84C8-832481F03DA7}"/>
+                <a16:creationId xmlns:a16="http://schemas.microsoft.com/office/drawing/2014/main" id="{F93AE793-283C-4DE6-BB4B-0F47B7D23E00}"/>
               </a:ext>
             </a:extLst>
           </p:cNvPr>
@@ -6625,15 +6931,23 @@
             <p:ph type="title"/>
           </p:nvPr>
         </p:nvSpPr>
-        <p:spPr/>
-        <p:txBody>
-          <a:bodyPr/>
+        <p:spPr>
+          <a:xfrm>
+            <a:off x="419099" y="485962"/>
+            <a:ext cx="8072968" cy="995705"/>
+          </a:xfrm>
+        </p:spPr>
+        <p:txBody>
+          <a:bodyPr>
+            <a:normAutofit/>
+          </a:bodyPr>
           <a:lstStyle/>
           <a:p>
             <a:r>
-              <a:rPr lang="en-US" dirty="0"/>
-              <a:t>Chicago</a:t>
-            </a:r>
+              <a:rPr lang="en-US" b="1" dirty="0"/>
+              <a:t>Are the houses selling? (cont.)</a:t>
+            </a:r>
+            <a:endParaRPr lang="en-US" dirty="0"/>
           </a:p>
         </p:txBody>
       </p:sp>
@@ -6642,7 +6956,7 @@
           <p:cNvPr id="3" name="Content Placeholder 2">
             <a:extLst>
               <a:ext uri="{FF2B5EF4-FFF2-40B4-BE49-F238E27FC236}">
-                <a16:creationId xmlns:a16="http://schemas.microsoft.com/office/drawing/2014/main" id="{1B04470E-59CF-46A6-A66D-F98B1BC2EFC8}"/>
+                <a16:creationId xmlns:a16="http://schemas.microsoft.com/office/drawing/2014/main" id="{4A71EE8A-E668-4E0E-8CCE-C6835DE85ABE}"/>
               </a:ext>
             </a:extLst>
           </p:cNvPr>
@@ -6653,15 +6967,53 @@
             <p:ph idx="1"/>
           </p:nvPr>
         </p:nvSpPr>
-        <p:spPr/>
-        <p:txBody>
-          <a:bodyPr/>
+        <p:spPr>
+          <a:xfrm>
+            <a:off x="465667" y="1415202"/>
+            <a:ext cx="10917766" cy="995705"/>
+          </a:xfrm>
+        </p:spPr>
+        <p:txBody>
+          <a:bodyPr>
+            <a:normAutofit fontScale="40000" lnSpcReduction="20000"/>
+          </a:bodyPr>
           <a:lstStyle/>
           <a:p>
-            <a:r>
-              <a:rPr lang="en-US" dirty="0"/>
-              <a:t>Overall a bad housing market, so no further analysis conducted.</a:t>
-            </a:r>
+            <a:pPr marL="0" indent="0">
+              <a:buNone/>
+            </a:pPr>
+            <a:r>
+              <a:rPr lang="en-US" sz="9600" b="1" dirty="0"/>
+              <a:t>Austin</a:t>
+            </a:r>
+            <a:endParaRPr lang="en-US" dirty="0"/>
+          </a:p>
+          <a:p>
+            <a:pPr marL="0" indent="0">
+              <a:buNone/>
+            </a:pPr>
+            <a:r>
+              <a:rPr lang="en-US" sz="4500" dirty="0"/>
+              <a:t>The market looks good here, the average price has gone up and is at a all time high at 450K.</a:t>
+            </a:r>
+          </a:p>
+          <a:p>
+            <a:pPr marL="0" indent="0">
+              <a:buNone/>
+            </a:pPr>
+            <a:endParaRPr lang="en-US" dirty="0"/>
+          </a:p>
+          <a:p>
+            <a:pPr marL="0" indent="0">
+              <a:buNone/>
+            </a:pPr>
+            <a:endParaRPr lang="en-US" dirty="0"/>
+          </a:p>
+          <a:p>
+            <a:pPr marL="0" indent="0">
+              <a:buNone/>
+            </a:pPr>
+            <a:endParaRPr lang="en-US" dirty="0"/>
           </a:p>
         </p:txBody>
       </p:sp>
@@ -6670,7 +7022,7 @@
           <p:cNvPr id="5" name="Picture 4">
             <a:extLst>
               <a:ext uri="{FF2B5EF4-FFF2-40B4-BE49-F238E27FC236}">
-                <a16:creationId xmlns:a16="http://schemas.microsoft.com/office/drawing/2014/main" id="{003AAD1E-29C1-4D5E-9E4C-8B00132BDA53}"/>
+                <a16:creationId xmlns:a16="http://schemas.microsoft.com/office/drawing/2014/main" id="{1E7F5EC6-CD76-4808-8F3A-40B9386F89C6}"/>
               </a:ext>
             </a:extLst>
           </p:cNvPr>
@@ -6693,8 +7045,8 @@
         </p:blipFill>
         <p:spPr>
           <a:xfrm>
-            <a:off x="1143002" y="2542117"/>
-            <a:ext cx="8665631" cy="3410627"/>
+            <a:off x="495300" y="2442633"/>
+            <a:ext cx="9876368" cy="3796431"/>
           </a:xfrm>
           <a:prstGeom prst="rect">
             <a:avLst/>
@@ -6704,7 +7056,7 @@
     </p:spTree>
     <p:extLst>
       <p:ext uri="{BB962C8B-B14F-4D97-AF65-F5344CB8AC3E}">
-        <p14:creationId xmlns:p14="http://schemas.microsoft.com/office/powerpoint/2010/main" val="80936674"/>
+        <p14:creationId xmlns:p14="http://schemas.microsoft.com/office/powerpoint/2010/main" val="25779863"/>
       </p:ext>
     </p:extLst>
   </p:cSld>

</xml_diff>